<commit_message>
Updated Module 2 Project and SQL ppt presentation
Re-ran all cells to update mu/std for each hypothesis test; removed duplicate word on ppt slide
</commit_message>
<xml_diff>
--- a/SQL presentation_3.22.19.pptx
+++ b/SQL presentation_3.22.19.pptx
@@ -5364,8 +5364,25 @@
                 <a:latin typeface="Segoe UI Semilight" panose="020B0402040204020203" pitchFamily="34" charset="0"/>
                 <a:cs typeface="Segoe UI Semilight" panose="020B0402040204020203" pitchFamily="34" charset="0"/>
               </a:rPr>
-              <a:t>: the number of products ordered was higher with a discount discount.</a:t>
-            </a:r>
+              <a:t>: the number of products ordered was higher with </a:t>
+            </a:r>
+            <a:r>
+              <a:rPr lang="en-US" sz="2000">
+                <a:solidFill>
+                  <a:srgbClr val="000000"/>
+                </a:solidFill>
+                <a:latin typeface="Segoe UI Semilight" panose="020B0402040204020203" pitchFamily="34" charset="0"/>
+                <a:cs typeface="Segoe UI Semilight" panose="020B0402040204020203" pitchFamily="34" charset="0"/>
+              </a:rPr>
+              <a:t>a discount.</a:t>
+            </a:r>
+            <a:endParaRPr lang="en-US" sz="2000" dirty="0">
+              <a:solidFill>
+                <a:srgbClr val="000000"/>
+              </a:solidFill>
+              <a:latin typeface="Segoe UI Semilight" panose="020B0402040204020203" pitchFamily="34" charset="0"/>
+              <a:cs typeface="Segoe UI Semilight" panose="020B0402040204020203" pitchFamily="34" charset="0"/>
+            </a:endParaRPr>
           </a:p>
           <a:p>
             <a:pPr marL="457200" lvl="1" indent="0">

</xml_diff>